<commit_message>
literature, making tapes functions more general
</commit_message>
<xml_diff>
--- a/info/biomasse_vergleich_MoMoK_BE.pptx
+++ b/info/biomasse_vergleich_MoMoK_BE.pptx
@@ -255,7 +255,7 @@
           <a:p>
             <a:fld id="{29D722E9-6DCE-4201-8B95-B327C6EEA894}" type="datetimeFigureOut">
               <a:rPr lang="de-DE" smtClean="0"/>
-              <a:t>13.04.2023</a:t>
+              <a:t>17.04.2023</a:t>
             </a:fld>
             <a:endParaRPr lang="de-DE"/>
           </a:p>
@@ -421,7 +421,7 @@
             <a:fld id="{7BE26D7E-6EA3-4F2D-BE94-EAA87D4EB8CD}" type="datetimeFigureOut">
               <a:rPr lang="de-DE" smtClean="0"/>
               <a:pPr/>
-              <a:t>13.04.2023</a:t>
+              <a:t>17.04.2023</a:t>
             </a:fld>
             <a:endParaRPr lang="de-DE"/>
           </a:p>

</xml_diff>